<commit_message>
update dashboards and docs
</commit_message>
<xml_diff>
--- a/observability.pptx
+++ b/observability.pptx
@@ -5,19 +5,20 @@
     <p:sldMasterId id="2147483648" r:id="rId1"/>
   </p:sldMasterIdLst>
   <p:notesMasterIdLst>
-    <p:notesMasterId r:id="rId12"/>
+    <p:notesMasterId r:id="rId13"/>
   </p:notesMasterIdLst>
   <p:sldIdLst>
     <p:sldId id="256" r:id="rId2"/>
-    <p:sldId id="267" r:id="rId3"/>
-    <p:sldId id="268" r:id="rId4"/>
-    <p:sldId id="262" r:id="rId5"/>
-    <p:sldId id="263" r:id="rId6"/>
-    <p:sldId id="266" r:id="rId7"/>
-    <p:sldId id="264" r:id="rId8"/>
-    <p:sldId id="265" r:id="rId9"/>
-    <p:sldId id="258" r:id="rId10"/>
-    <p:sldId id="257" r:id="rId11"/>
+    <p:sldId id="269" r:id="rId3"/>
+    <p:sldId id="267" r:id="rId4"/>
+    <p:sldId id="268" r:id="rId5"/>
+    <p:sldId id="262" r:id="rId6"/>
+    <p:sldId id="263" r:id="rId7"/>
+    <p:sldId id="266" r:id="rId8"/>
+    <p:sldId id="264" r:id="rId9"/>
+    <p:sldId id="265" r:id="rId10"/>
+    <p:sldId id="258" r:id="rId11"/>
+    <p:sldId id="257" r:id="rId12"/>
   </p:sldIdLst>
   <p:sldSz cx="12192000" cy="6858000"/>
   <p:notesSz cx="6858000" cy="9144000"/>
@@ -539,7 +540,7 @@
           <a:p>
             <a:fld id="{E510A0CC-6D1A-B243-81DA-8ACCAD46E146}" type="slidenum">
               <a:rPr lang="en-NO" smtClean="0"/>
-              <a:t>2</a:t>
+              <a:t>3</a:t>
             </a:fld>
             <a:endParaRPr lang="en-NO"/>
           </a:p>
@@ -623,7 +624,7 @@
           <a:p>
             <a:fld id="{E510A0CC-6D1A-B243-81DA-8ACCAD46E146}" type="slidenum">
               <a:rPr lang="en-NO" smtClean="0"/>
-              <a:t>5</a:t>
+              <a:t>6</a:t>
             </a:fld>
             <a:endParaRPr lang="en-NO"/>
           </a:p>
@@ -686,7 +687,26 @@
           <a:bodyPr/>
           <a:lstStyle/>
           <a:p>
-            <a:endParaRPr lang="en-NO" dirty="0"/>
+            <a:r>
+              <a:rPr lang="en-NO" dirty="0"/>
+              <a:t>Trace the flow</a:t>
+            </a:r>
+          </a:p>
+          <a:p>
+            <a:r>
+              <a:rPr lang="en-NO" dirty="0"/>
+              <a:t>Statistics on failures</a:t>
+            </a:r>
+          </a:p>
+          <a:p>
+            <a:r>
+              <a:rPr lang="en-GB" dirty="0"/>
+              <a:t>L</a:t>
+            </a:r>
+            <a:r>
+              <a:rPr lang="en-NO" dirty="0"/>
+              <a:t>og statements linked to traces</a:t>
+            </a:r>
           </a:p>
         </p:txBody>
       </p:sp>
@@ -707,7 +727,7 @@
           <a:p>
             <a:fld id="{E510A0CC-6D1A-B243-81DA-8ACCAD46E146}" type="slidenum">
               <a:rPr lang="en-NO" smtClean="0"/>
-              <a:t>6</a:t>
+              <a:t>7</a:t>
             </a:fld>
             <a:endParaRPr lang="en-NO"/>
           </a:p>
@@ -772,6 +792,15 @@
           <a:p>
             <a:r>
               <a:rPr lang="en-NO" dirty="0"/>
+              <a:t>Sometimes – Standardize to increase inovation.</a:t>
+            </a:r>
+          </a:p>
+          <a:p>
+            <a:endParaRPr lang="en-NO" dirty="0"/>
+          </a:p>
+          <a:p>
+            <a:r>
+              <a:rPr lang="en-NO" dirty="0"/>
               <a:t>It works, it works across technologies and is found “everywhere”</a:t>
             </a:r>
           </a:p>
@@ -800,7 +829,7 @@
           <a:p>
             <a:fld id="{E510A0CC-6D1A-B243-81DA-8ACCAD46E146}" type="slidenum">
               <a:rPr lang="en-NO" smtClean="0"/>
-              <a:t>7</a:t>
+              <a:t>8</a:t>
             </a:fld>
             <a:endParaRPr lang="en-NO"/>
           </a:p>
@@ -810,6 +839,423 @@
     <p:extLst>
       <p:ext uri="{BB962C8B-B14F-4D97-AF65-F5344CB8AC3E}">
         <p14:creationId xmlns:p14="http://schemas.microsoft.com/office/powerpoint/2010/main" val="3473693535"/>
+      </p:ext>
+    </p:extLst>
+  </p:cSld>
+  <p:clrMapOvr>
+    <a:masterClrMapping/>
+  </p:clrMapOvr>
+</p:notes>
+</file>
+
+<file path=ppt/notesSlides/notesSlide5.xml><?xml version="1.0" encoding="utf-8"?>
+<p:notes xmlns:a="http://schemas.openxmlformats.org/drawingml/2006/main" xmlns:r="http://schemas.openxmlformats.org/officeDocument/2006/relationships" xmlns:p="http://schemas.openxmlformats.org/presentationml/2006/main">
+  <p:cSld>
+    <p:spTree>
+      <p:nvGrpSpPr>
+        <p:cNvPr id="1" name=""/>
+        <p:cNvGrpSpPr/>
+        <p:nvPr/>
+      </p:nvGrpSpPr>
+      <p:grpSpPr>
+        <a:xfrm>
+          <a:off x="0" y="0"/>
+          <a:ext cx="0" cy="0"/>
+          <a:chOff x="0" y="0"/>
+          <a:chExt cx="0" cy="0"/>
+        </a:xfrm>
+      </p:grpSpPr>
+      <p:sp>
+        <p:nvSpPr>
+          <p:cNvPr id="2" name="Slide Image Placeholder 1"/>
+          <p:cNvSpPr>
+            <a:spLocks noGrp="1" noRot="1" noChangeAspect="1"/>
+          </p:cNvSpPr>
+          <p:nvPr>
+            <p:ph type="sldImg"/>
+          </p:nvPr>
+        </p:nvSpPr>
+        <p:spPr/>
+      </p:sp>
+      <p:sp>
+        <p:nvSpPr>
+          <p:cNvPr id="3" name="Notes Placeholder 2"/>
+          <p:cNvSpPr>
+            <a:spLocks noGrp="1"/>
+          </p:cNvSpPr>
+          <p:nvPr>
+            <p:ph type="body" idx="1"/>
+          </p:nvPr>
+        </p:nvSpPr>
+        <p:spPr/>
+        <p:txBody>
+          <a:bodyPr/>
+          <a:lstStyle/>
+          <a:p>
+            <a:pPr marL="0" marR="0" lvl="0" indent="0" algn="l" defTabSz="914400" rtl="0" eaLnBrk="1" fontAlgn="auto" latinLnBrk="0" hangingPunct="1">
+              <a:lnSpc>
+                <a:spcPct val="100000"/>
+              </a:lnSpc>
+              <a:spcBef>
+                <a:spcPts val="0"/>
+              </a:spcBef>
+              <a:spcAft>
+                <a:spcPts val="0"/>
+              </a:spcAft>
+              <a:buClrTx/>
+              <a:buSzTx/>
+              <a:buFontTx/>
+              <a:buNone/>
+              <a:tabLst/>
+              <a:defRPr/>
+            </a:pPr>
+            <a:r>
+              <a:rPr lang="en-NO" dirty="0"/>
+              <a:t>OTLP </a:t>
+            </a:r>
+            <a:r>
+              <a:rPr lang="en-GB" b="1" i="0" dirty="0" err="1">
+                <a:solidFill>
+                  <a:srgbClr val="E6EDF3"/>
+                </a:solidFill>
+                <a:effectLst/>
+                <a:highlight>
+                  <a:srgbClr val="0D1117"/>
+                </a:highlight>
+                <a:latin typeface="-apple-system"/>
+              </a:rPr>
+              <a:t>OpenTelemetry</a:t>
+            </a:r>
+            <a:r>
+              <a:rPr lang="en-GB" b="1" i="0" dirty="0">
+                <a:solidFill>
+                  <a:srgbClr val="E6EDF3"/>
+                </a:solidFill>
+                <a:effectLst/>
+                <a:highlight>
+                  <a:srgbClr val="0D1117"/>
+                </a:highlight>
+                <a:latin typeface="-apple-system"/>
+              </a:rPr>
+              <a:t> Wire Protocol</a:t>
+            </a:r>
+            <a:endParaRPr lang="en-NO" dirty="0"/>
+          </a:p>
+          <a:p>
+            <a:r>
+              <a:rPr lang="en-NO" dirty="0"/>
+              <a:t>	Backpressure signaling</a:t>
+            </a:r>
+          </a:p>
+          <a:p>
+            <a:r>
+              <a:rPr lang="en-NO" dirty="0"/>
+              <a:t>	Low CPU serial/deserial</a:t>
+            </a:r>
+          </a:p>
+          <a:p>
+            <a:r>
+              <a:rPr lang="en-NO" dirty="0"/>
+              <a:t>	loadbalanser friendly</a:t>
+            </a:r>
+          </a:p>
+          <a:p>
+            <a:r>
+              <a:rPr lang="en-NO" dirty="0"/>
+              <a:t>	Minimal memory pressure</a:t>
+            </a:r>
+          </a:p>
+          <a:p>
+            <a:r>
+              <a:rPr lang="en-NO" dirty="0"/>
+              <a:t>Pipelines</a:t>
+            </a:r>
+          </a:p>
+          <a:p>
+            <a:r>
+              <a:rPr lang="en-NO" dirty="0"/>
+              <a:t>	Receive -&gt; Process -&gt; Export</a:t>
+            </a:r>
+          </a:p>
+          <a:p>
+            <a:endParaRPr lang="en-NO" dirty="0"/>
+          </a:p>
+          <a:p>
+            <a:r>
+              <a:rPr lang="en-NO" dirty="0"/>
+              <a:t>Receive:</a:t>
+            </a:r>
+          </a:p>
+          <a:p>
+            <a:r>
+              <a:rPr lang="en-NO" dirty="0"/>
+              <a:t>	OTLP from .NET app</a:t>
+            </a:r>
+          </a:p>
+          <a:p>
+            <a:r>
+              <a:rPr lang="en-NO" dirty="0"/>
+              <a:t>Processors:</a:t>
+            </a:r>
+          </a:p>
+          <a:p>
+            <a:r>
+              <a:rPr lang="en-NO" dirty="0"/>
+              <a:t>	Limiters – Memory limiters</a:t>
+            </a:r>
+          </a:p>
+          <a:p>
+            <a:r>
+              <a:rPr lang="en-NO" dirty="0"/>
+              <a:t>	Samplers – </a:t>
+            </a:r>
+          </a:p>
+          <a:p>
+            <a:r>
+              <a:rPr lang="en-NO" dirty="0"/>
+              <a:t>	Batch - </a:t>
+            </a:r>
+            <a:r>
+              <a:rPr lang="en-GB" b="0" i="0" dirty="0">
+                <a:solidFill>
+                  <a:srgbClr val="E6EDF3"/>
+                </a:solidFill>
+                <a:effectLst/>
+                <a:highlight>
+                  <a:srgbClr val="0D1117"/>
+                </a:highlight>
+                <a:latin typeface="-apple-system"/>
+              </a:rPr>
+              <a:t>The batch processor accepts spans, metrics, or logs and places them into batches. Batching helps better compress the data and reduce the number of outgoing connections required to transmit the data</a:t>
+            </a:r>
+          </a:p>
+          <a:p>
+            <a:pPr marL="0" marR="0" lvl="0" indent="0" algn="l" defTabSz="914400" rtl="0" eaLnBrk="1" fontAlgn="auto" latinLnBrk="0" hangingPunct="1">
+              <a:lnSpc>
+                <a:spcPct val="100000"/>
+              </a:lnSpc>
+              <a:spcBef>
+                <a:spcPts val="0"/>
+              </a:spcBef>
+              <a:spcAft>
+                <a:spcPts val="0"/>
+              </a:spcAft>
+              <a:buClrTx/>
+              <a:buSzTx/>
+              <a:buFontTx/>
+              <a:buNone/>
+              <a:tabLst/>
+              <a:defRPr/>
+            </a:pPr>
+            <a:r>
+              <a:rPr lang="en-GB" b="0" i="0" dirty="0">
+                <a:solidFill>
+                  <a:srgbClr val="E6EDF3"/>
+                </a:solidFill>
+                <a:effectLst/>
+                <a:highlight>
+                  <a:srgbClr val="0D1117"/>
+                </a:highlight>
+                <a:latin typeface="-apple-system"/>
+              </a:rPr>
+              <a:t>	Attributes</a:t>
+            </a:r>
+          </a:p>
+          <a:p>
+            <a:pPr marL="0" marR="0" lvl="0" indent="0" algn="l" defTabSz="914400" rtl="0" eaLnBrk="1" fontAlgn="auto" latinLnBrk="0" hangingPunct="1">
+              <a:lnSpc>
+                <a:spcPct val="100000"/>
+              </a:lnSpc>
+              <a:spcBef>
+                <a:spcPts val="0"/>
+              </a:spcBef>
+              <a:spcAft>
+                <a:spcPts val="0"/>
+              </a:spcAft>
+              <a:buClrTx/>
+              <a:buSzTx/>
+              <a:buFontTx/>
+              <a:buNone/>
+              <a:tabLst/>
+              <a:defRPr/>
+            </a:pPr>
+            <a:r>
+              <a:rPr lang="en-GB" b="0" i="0" dirty="0">
+                <a:solidFill>
+                  <a:srgbClr val="E6EDF3"/>
+                </a:solidFill>
+                <a:effectLst/>
+                <a:highlight>
+                  <a:srgbClr val="0D1117"/>
+                </a:highlight>
+                <a:latin typeface="-apple-system"/>
+              </a:rPr>
+              <a:t>Export:</a:t>
+            </a:r>
+          </a:p>
+          <a:p>
+            <a:pPr marL="0" marR="0" lvl="0" indent="0" algn="l" defTabSz="914400" rtl="0" eaLnBrk="1" fontAlgn="auto" latinLnBrk="0" hangingPunct="1">
+              <a:lnSpc>
+                <a:spcPct val="100000"/>
+              </a:lnSpc>
+              <a:spcBef>
+                <a:spcPts val="0"/>
+              </a:spcBef>
+              <a:spcAft>
+                <a:spcPts val="0"/>
+              </a:spcAft>
+              <a:buClrTx/>
+              <a:buSzTx/>
+              <a:buFontTx/>
+              <a:buNone/>
+              <a:tabLst/>
+              <a:defRPr/>
+            </a:pPr>
+            <a:r>
+              <a:rPr lang="en-GB" b="0" i="0" dirty="0">
+                <a:solidFill>
+                  <a:srgbClr val="E6EDF3"/>
+                </a:solidFill>
+                <a:effectLst/>
+                <a:highlight>
+                  <a:srgbClr val="0D1117"/>
+                </a:highlight>
+                <a:latin typeface="-apple-system"/>
+              </a:rPr>
+              <a:t>	More and more OTLP</a:t>
+            </a:r>
+          </a:p>
+          <a:p>
+            <a:endParaRPr lang="en-NO" dirty="0"/>
+          </a:p>
+          <a:p>
+            <a:r>
+              <a:rPr lang="en-NO" dirty="0"/>
+              <a:t>				</a:t>
+            </a:r>
+          </a:p>
+          <a:p>
+            <a:r>
+              <a:rPr lang="en-NO" dirty="0"/>
+              <a:t>	</a:t>
+            </a:r>
+          </a:p>
+          <a:p>
+            <a:endParaRPr lang="en-NO" dirty="0"/>
+          </a:p>
+        </p:txBody>
+      </p:sp>
+      <p:sp>
+        <p:nvSpPr>
+          <p:cNvPr id="4" name="Slide Number Placeholder 3"/>
+          <p:cNvSpPr>
+            <a:spLocks noGrp="1"/>
+          </p:cNvSpPr>
+          <p:nvPr>
+            <p:ph type="sldNum" sz="quarter" idx="5"/>
+          </p:nvPr>
+        </p:nvSpPr>
+        <p:spPr/>
+        <p:txBody>
+          <a:bodyPr/>
+          <a:lstStyle/>
+          <a:p>
+            <a:fld id="{E510A0CC-6D1A-B243-81DA-8ACCAD46E146}" type="slidenum">
+              <a:rPr lang="en-NO" smtClean="0"/>
+              <a:t>9</a:t>
+            </a:fld>
+            <a:endParaRPr lang="en-NO"/>
+          </a:p>
+        </p:txBody>
+      </p:sp>
+    </p:spTree>
+    <p:extLst>
+      <p:ext uri="{BB962C8B-B14F-4D97-AF65-F5344CB8AC3E}">
+        <p14:creationId xmlns:p14="http://schemas.microsoft.com/office/powerpoint/2010/main" val="2249404238"/>
+      </p:ext>
+    </p:extLst>
+  </p:cSld>
+  <p:clrMapOvr>
+    <a:masterClrMapping/>
+  </p:clrMapOvr>
+</p:notes>
+</file>
+
+<file path=ppt/notesSlides/notesSlide6.xml><?xml version="1.0" encoding="utf-8"?>
+<p:notes xmlns:a="http://schemas.openxmlformats.org/drawingml/2006/main" xmlns:r="http://schemas.openxmlformats.org/officeDocument/2006/relationships" xmlns:p="http://schemas.openxmlformats.org/presentationml/2006/main">
+  <p:cSld>
+    <p:spTree>
+      <p:nvGrpSpPr>
+        <p:cNvPr id="1" name=""/>
+        <p:cNvGrpSpPr/>
+        <p:nvPr/>
+      </p:nvGrpSpPr>
+      <p:grpSpPr>
+        <a:xfrm>
+          <a:off x="0" y="0"/>
+          <a:ext cx="0" cy="0"/>
+          <a:chOff x="0" y="0"/>
+          <a:chExt cx="0" cy="0"/>
+        </a:xfrm>
+      </p:grpSpPr>
+      <p:sp>
+        <p:nvSpPr>
+          <p:cNvPr id="2" name="Slide Image Placeholder 1"/>
+          <p:cNvSpPr>
+            <a:spLocks noGrp="1" noRot="1" noChangeAspect="1"/>
+          </p:cNvSpPr>
+          <p:nvPr>
+            <p:ph type="sldImg"/>
+          </p:nvPr>
+        </p:nvSpPr>
+        <p:spPr/>
+      </p:sp>
+      <p:sp>
+        <p:nvSpPr>
+          <p:cNvPr id="3" name="Notes Placeholder 2"/>
+          <p:cNvSpPr>
+            <a:spLocks noGrp="1"/>
+          </p:cNvSpPr>
+          <p:nvPr>
+            <p:ph type="body" idx="1"/>
+          </p:nvPr>
+        </p:nvSpPr>
+        <p:spPr/>
+        <p:txBody>
+          <a:bodyPr/>
+          <a:lstStyle/>
+          <a:p>
+            <a:endParaRPr lang="en-NO" dirty="0"/>
+          </a:p>
+        </p:txBody>
+      </p:sp>
+      <p:sp>
+        <p:nvSpPr>
+          <p:cNvPr id="4" name="Slide Number Placeholder 3"/>
+          <p:cNvSpPr>
+            <a:spLocks noGrp="1"/>
+          </p:cNvSpPr>
+          <p:nvPr>
+            <p:ph type="sldNum" sz="quarter" idx="5"/>
+          </p:nvPr>
+        </p:nvSpPr>
+        <p:spPr/>
+        <p:txBody>
+          <a:bodyPr/>
+          <a:lstStyle/>
+          <a:p>
+            <a:fld id="{E510A0CC-6D1A-B243-81DA-8ACCAD46E146}" type="slidenum">
+              <a:rPr lang="en-NO" smtClean="0"/>
+              <a:t>11</a:t>
+            </a:fld>
+            <a:endParaRPr lang="en-NO"/>
+          </a:p>
+        </p:txBody>
+      </p:sp>
+    </p:spTree>
+    <p:extLst>
+      <p:ext uri="{BB962C8B-B14F-4D97-AF65-F5344CB8AC3E}">
+        <p14:creationId xmlns:p14="http://schemas.microsoft.com/office/powerpoint/2010/main" val="2708001141"/>
       </p:ext>
     </p:extLst>
   </p:cSld>
@@ -4121,6 +4567,160 @@
           <p:cNvPr id="2" name="Title 1">
             <a:extLst>
               <a:ext uri="{FF2B5EF4-FFF2-40B4-BE49-F238E27FC236}">
+                <a16:creationId xmlns:a16="http://schemas.microsoft.com/office/drawing/2014/main" id="{6943A4DA-3EB0-2D66-870C-52F9216C1666}"/>
+              </a:ext>
+            </a:extLst>
+          </p:cNvPr>
+          <p:cNvSpPr>
+            <a:spLocks noGrp="1"/>
+          </p:cNvSpPr>
+          <p:nvPr>
+            <p:ph type="title"/>
+          </p:nvPr>
+        </p:nvSpPr>
+        <p:spPr/>
+        <p:txBody>
+          <a:bodyPr/>
+          <a:lstStyle/>
+          <a:p>
+            <a:r>
+              <a:rPr lang="nb-NO" dirty="0"/>
+              <a:t>Signals</a:t>
+            </a:r>
+          </a:p>
+        </p:txBody>
+      </p:sp>
+      <p:sp>
+        <p:nvSpPr>
+          <p:cNvPr id="3" name="Content Placeholder 2">
+            <a:extLst>
+              <a:ext uri="{FF2B5EF4-FFF2-40B4-BE49-F238E27FC236}">
+                <a16:creationId xmlns:a16="http://schemas.microsoft.com/office/drawing/2014/main" id="{0FE594A9-147F-442B-B4F5-5443F89AC366}"/>
+              </a:ext>
+            </a:extLst>
+          </p:cNvPr>
+          <p:cNvSpPr>
+            <a:spLocks noGrp="1"/>
+          </p:cNvSpPr>
+          <p:nvPr>
+            <p:ph idx="1"/>
+          </p:nvPr>
+        </p:nvSpPr>
+        <p:spPr/>
+        <p:txBody>
+          <a:bodyPr/>
+          <a:lstStyle/>
+          <a:p>
+            <a:r>
+              <a:rPr lang="nb-NO" dirty="0"/>
+              <a:t>Traces –&gt; Connect </a:t>
+            </a:r>
+            <a:r>
+              <a:rPr lang="nb-NO" dirty="0" err="1"/>
+              <a:t>the</a:t>
+            </a:r>
+            <a:r>
+              <a:rPr lang="nb-NO" dirty="0"/>
+              <a:t> </a:t>
+            </a:r>
+            <a:r>
+              <a:rPr lang="nb-NO" dirty="0" err="1"/>
+              <a:t>components</a:t>
+            </a:r>
+            <a:endParaRPr lang="nb-NO" dirty="0"/>
+          </a:p>
+          <a:p>
+            <a:r>
+              <a:rPr lang="nb-NO" dirty="0" err="1"/>
+              <a:t>Metrics</a:t>
+            </a:r>
+            <a:r>
+              <a:rPr lang="nb-NO" dirty="0"/>
+              <a:t> -&gt; </a:t>
+            </a:r>
+            <a:r>
+              <a:rPr lang="nb-NO" dirty="0" err="1"/>
+              <a:t>Quantify</a:t>
+            </a:r>
+            <a:r>
+              <a:rPr lang="nb-NO" dirty="0"/>
+              <a:t> and show </a:t>
+            </a:r>
+            <a:r>
+              <a:rPr lang="nb-NO" dirty="0" err="1"/>
+              <a:t>statistics</a:t>
+            </a:r>
+            <a:endParaRPr lang="nb-NO" dirty="0"/>
+          </a:p>
+          <a:p>
+            <a:r>
+              <a:rPr lang="nb-NO" dirty="0"/>
+              <a:t>Logs -&gt; Tell a story</a:t>
+            </a:r>
+          </a:p>
+          <a:p>
+            <a:endParaRPr lang="nb-NO" dirty="0"/>
+          </a:p>
+          <a:p>
+            <a:endParaRPr lang="nb-NO" dirty="0"/>
+          </a:p>
+          <a:p>
+            <a:r>
+              <a:rPr lang="nb-NO" dirty="0"/>
+              <a:t>And OTEL links it </a:t>
+            </a:r>
+            <a:r>
+              <a:rPr lang="nb-NO" dirty="0" err="1"/>
+              <a:t>together</a:t>
+            </a:r>
+            <a:r>
+              <a:rPr lang="nb-NO" dirty="0"/>
+              <a:t>; Logs -&gt; Traces</a:t>
+            </a:r>
+          </a:p>
+          <a:p>
+            <a:pPr marL="0" indent="0">
+              <a:buNone/>
+            </a:pPr>
+            <a:endParaRPr lang="nb-NO" dirty="0"/>
+          </a:p>
+        </p:txBody>
+      </p:sp>
+    </p:spTree>
+    <p:extLst>
+      <p:ext uri="{BB962C8B-B14F-4D97-AF65-F5344CB8AC3E}">
+        <p14:creationId xmlns:p14="http://schemas.microsoft.com/office/powerpoint/2010/main" val="1761284807"/>
+      </p:ext>
+    </p:extLst>
+  </p:cSld>
+  <p:clrMapOvr>
+    <a:masterClrMapping/>
+  </p:clrMapOvr>
+</p:sld>
+</file>
+
+<file path=ppt/slides/slide11.xml><?xml version="1.0" encoding="utf-8"?>
+<p:sld xmlns:a="http://schemas.openxmlformats.org/drawingml/2006/main" xmlns:r="http://schemas.openxmlformats.org/officeDocument/2006/relationships" xmlns:p="http://schemas.openxmlformats.org/presentationml/2006/main">
+  <p:cSld>
+    <p:spTree>
+      <p:nvGrpSpPr>
+        <p:cNvPr id="1" name=""/>
+        <p:cNvGrpSpPr/>
+        <p:nvPr/>
+      </p:nvGrpSpPr>
+      <p:grpSpPr>
+        <a:xfrm>
+          <a:off x="0" y="0"/>
+          <a:ext cx="0" cy="0"/>
+          <a:chOff x="0" y="0"/>
+          <a:chExt cx="0" cy="0"/>
+        </a:xfrm>
+      </p:grpSpPr>
+      <p:sp>
+        <p:nvSpPr>
+          <p:cNvPr id="2" name="Title 1">
+            <a:extLst>
+              <a:ext uri="{FF2B5EF4-FFF2-40B4-BE49-F238E27FC236}">
                 <a16:creationId xmlns:a16="http://schemas.microsoft.com/office/drawing/2014/main" id="{C55E4364-7CAA-93C1-7155-26C30EF0811C}"/>
               </a:ext>
             </a:extLst>
@@ -4162,44 +4762,27 @@
         </p:nvSpPr>
         <p:spPr/>
         <p:txBody>
-          <a:bodyPr/>
-          <a:lstStyle/>
-          <a:p>
-            <a:r>
-              <a:rPr lang="nb-NO" dirty="0">
-                <a:hlinkClick r:id="rId2"/>
-              </a:rPr>
-              <a:t>https://opentelemetry.io/docs</a:t>
-            </a:r>
-            <a:endParaRPr lang="nb-NO" dirty="0"/>
-          </a:p>
+          <a:bodyPr>
+            <a:normAutofit lnSpcReduction="10000"/>
+          </a:bodyPr>
+          <a:lstStyle/>
           <a:p>
             <a:r>
               <a:rPr lang="nb-NO" dirty="0">
                 <a:hlinkClick r:id="rId3"/>
               </a:rPr>
-              <a:t>https://github.com/rogerhmar</a:t>
-            </a:r>
-            <a:r>
-              <a:rPr lang="nb-NO">
-                <a:hlinkClick r:id="rId3"/>
-              </a:rPr>
-              <a:t>/OTEL-NDC-2024</a:t>
-            </a:r>
-            <a:endParaRPr lang="nb-NO"/>
-          </a:p>
-          <a:p>
-            <a:r>
-              <a:rPr lang="nb-NO">
-                <a:hlinkClick r:id="rId4"/>
-              </a:rPr>
-              <a:t>https</a:t>
-            </a:r>
+              <a:t>https://github.com/rogerhmar/OTEL-NDC-2024</a:t>
+            </a:r>
+            <a:endParaRPr lang="nb-NO" dirty="0">
+              <a:hlinkClick r:id="rId4"/>
+            </a:endParaRPr>
+          </a:p>
+          <a:p>
             <a:r>
               <a:rPr lang="nb-NO" dirty="0">
                 <a:hlinkClick r:id="rId4"/>
               </a:rPr>
-              <a:t>://devblogs.microsoft.com/dotnet/azure-monitor-opentelemetry-distro/</a:t>
+              <a:t>https://opentelemetry.io/docs</a:t>
             </a:r>
             <a:endParaRPr lang="nb-NO" dirty="0"/>
           </a:p>
@@ -4207,6 +4790,44 @@
             <a:r>
               <a:rPr lang="nb-NO" dirty="0">
                 <a:hlinkClick r:id="rId5"/>
+              </a:rPr>
+              <a:t>https://opentelemetry.io/docs/specs/otlp/</a:t>
+            </a:r>
+            <a:endParaRPr lang="nb-NO" dirty="0"/>
+          </a:p>
+          <a:p>
+            <a:pPr lvl="1"/>
+            <a:r>
+              <a:rPr lang="nb-NO" dirty="0">
+                <a:hlinkClick r:id="rId6"/>
+              </a:rPr>
+              <a:t>https://grpc.io/docs/what-is-grpc/introduction/</a:t>
+            </a:r>
+            <a:endParaRPr lang="nb-NO" dirty="0"/>
+          </a:p>
+          <a:p>
+            <a:pPr lvl="1"/>
+            <a:r>
+              <a:rPr lang="nb-NO" dirty="0">
+                <a:hlinkClick r:id="rId7"/>
+              </a:rPr>
+              <a:t>https://grpc.io/docs/what-is-grpc/core-concepts/</a:t>
+            </a:r>
+            <a:endParaRPr lang="nb-NO" dirty="0"/>
+          </a:p>
+          <a:p>
+            <a:r>
+              <a:rPr lang="nb-NO" dirty="0">
+                <a:hlinkClick r:id="rId8"/>
+              </a:rPr>
+              <a:t>https://devblogs.microsoft.com/dotnet/azure-monitor-opentelemetry-distro/</a:t>
+            </a:r>
+            <a:endParaRPr lang="nb-NO" dirty="0"/>
+          </a:p>
+          <a:p>
+            <a:r>
+              <a:rPr lang="nb-NO" dirty="0">
+                <a:hlinkClick r:id="rId9"/>
               </a:rPr>
               <a:t>https://learn.microsoft.com/en-us/azure/azure-monitor/app/opentelemetry-configuration?tabs=aspnetcore#why-is-microsoft-azure-monitor-investing-in-opentelemetry</a:t>
             </a:r>
@@ -4252,7 +4873,7 @@
           <p:cNvPr id="2" name="Title 1">
             <a:extLst>
               <a:ext uri="{FF2B5EF4-FFF2-40B4-BE49-F238E27FC236}">
-                <a16:creationId xmlns:a16="http://schemas.microsoft.com/office/drawing/2014/main" id="{33253DB6-C3F5-D1BC-E3D0-54299730217A}"/>
+                <a16:creationId xmlns:a16="http://schemas.microsoft.com/office/drawing/2014/main" id="{308122FC-CA63-9635-E954-C58A111C9653}"/>
               </a:ext>
             </a:extLst>
           </p:cNvPr>
@@ -4268,10 +4889,7 @@
           <a:bodyPr/>
           <a:lstStyle/>
           <a:p>
-            <a:r>
-              <a:rPr lang="en-NO" dirty="0"/>
-              <a:t>Goal of this workshop</a:t>
-            </a:r>
+            <a:endParaRPr lang="en-NO"/>
           </a:p>
         </p:txBody>
       </p:sp>
@@ -4280,7 +4898,7 @@
           <p:cNvPr id="3" name="Content Placeholder 2">
             <a:extLst>
               <a:ext uri="{FF2B5EF4-FFF2-40B4-BE49-F238E27FC236}">
-                <a16:creationId xmlns:a16="http://schemas.microsoft.com/office/drawing/2014/main" id="{E3BA24CA-4459-DE84-8BA8-FABB2129080F}"/>
+                <a16:creationId xmlns:a16="http://schemas.microsoft.com/office/drawing/2014/main" id="{28135D6B-9AC8-ADC2-DB1D-8546CB5CAFC9}"/>
               </a:ext>
             </a:extLst>
           </p:cNvPr>
@@ -4297,49 +4915,27 @@
           <a:lstStyle/>
           <a:p>
             <a:r>
-              <a:rPr lang="en-GB" dirty="0"/>
-              <a:t>Your own local setup for </a:t>
-            </a:r>
-            <a:r>
-              <a:rPr lang="en-GB" dirty="0" err="1"/>
-              <a:t>OpenTelemetry</a:t>
-            </a:r>
-            <a:endParaRPr lang="en-GB" dirty="0"/>
-          </a:p>
-          <a:p>
-            <a:r>
-              <a:rPr lang="en-GB" dirty="0"/>
-              <a:t>Better understanding of what </a:t>
-            </a:r>
-            <a:r>
-              <a:rPr lang="en-GB" dirty="0" err="1"/>
-              <a:t>OpenTelemetry</a:t>
-            </a:r>
-            <a:r>
-              <a:rPr lang="en-GB" dirty="0"/>
-              <a:t> is</a:t>
-            </a:r>
-          </a:p>
-          <a:p>
-            <a:r>
-              <a:rPr lang="en-GB" dirty="0"/>
-              <a:t>An example of how to add </a:t>
-            </a:r>
-            <a:r>
-              <a:rPr lang="en-GB" dirty="0" err="1"/>
-              <a:t>OpenTelemetry</a:t>
-            </a:r>
-            <a:r>
-              <a:rPr lang="en-GB" dirty="0"/>
-              <a:t> to a .NET application</a:t>
-            </a:r>
+              <a:rPr lang="nb-NO" dirty="0">
+                <a:hlinkClick r:id="rId2"/>
+              </a:rPr>
+              <a:t>https://github.com/rogerhmar/OTEL-NDC-2024</a:t>
+            </a:r>
+            <a:endParaRPr lang="nb-NO" dirty="0">
+              <a:hlinkClick r:id="rId3"/>
+            </a:endParaRPr>
+          </a:p>
+          <a:p>
+            <a:pPr marL="0" indent="0">
+              <a:buNone/>
+            </a:pPr>
+            <a:endParaRPr lang="en-NO" dirty="0"/>
           </a:p>
         </p:txBody>
       </p:sp>
     </p:spTree>
     <p:extLst>
       <p:ext uri="{BB962C8B-B14F-4D97-AF65-F5344CB8AC3E}">
-        <p14:creationId xmlns:p14="http://schemas.microsoft.com/office/powerpoint/2010/main" val="3736642612"/>
+        <p14:creationId xmlns:p14="http://schemas.microsoft.com/office/powerpoint/2010/main" val="2180647721"/>
       </p:ext>
     </p:extLst>
   </p:cSld>
@@ -4371,7 +4967,7 @@
           <p:cNvPr id="2" name="Title 1">
             <a:extLst>
               <a:ext uri="{FF2B5EF4-FFF2-40B4-BE49-F238E27FC236}">
-                <a16:creationId xmlns:a16="http://schemas.microsoft.com/office/drawing/2014/main" id="{06A256B9-3396-7782-7105-B2172B762D3C}"/>
+                <a16:creationId xmlns:a16="http://schemas.microsoft.com/office/drawing/2014/main" id="{33253DB6-C3F5-D1BC-E3D0-54299730217A}"/>
               </a:ext>
             </a:extLst>
           </p:cNvPr>
@@ -4389,7 +4985,7 @@
           <a:p>
             <a:r>
               <a:rPr lang="en-NO" dirty="0"/>
-              <a:t>Shape of the workshop</a:t>
+              <a:t>Goal of this workshop</a:t>
             </a:r>
           </a:p>
         </p:txBody>
@@ -4399,7 +4995,7 @@
           <p:cNvPr id="3" name="Content Placeholder 2">
             <a:extLst>
               <a:ext uri="{FF2B5EF4-FFF2-40B4-BE49-F238E27FC236}">
-                <a16:creationId xmlns:a16="http://schemas.microsoft.com/office/drawing/2014/main" id="{4DD0C720-4189-75AA-4423-359655BB8E71}"/>
+                <a16:creationId xmlns:a16="http://schemas.microsoft.com/office/drawing/2014/main" id="{E3BA24CA-4459-DE84-8BA8-FABB2129080F}"/>
               </a:ext>
             </a:extLst>
           </p:cNvPr>
@@ -4416,20 +5012,41 @@
           <a:lstStyle/>
           <a:p>
             <a:r>
-              <a:rPr lang="en-NO" dirty="0"/>
-              <a:t>Follow your own pace</a:t>
-            </a:r>
-          </a:p>
-          <a:p>
-            <a:r>
-              <a:rPr lang="en-NO" dirty="0"/>
-              <a:t>I will go through some solutiuons in plenium, if needed/requested. You can choose to listen or not</a:t>
-            </a:r>
-          </a:p>
-          <a:p>
-            <a:r>
-              <a:rPr lang="en-NO" dirty="0"/>
-              <a:t>Help each other and colaborate</a:t>
+              <a:rPr lang="en-GB" dirty="0"/>
+              <a:t>Your own local setup for </a:t>
+            </a:r>
+            <a:r>
+              <a:rPr lang="en-GB" dirty="0" err="1"/>
+              <a:t>OpenTelemetry</a:t>
+            </a:r>
+            <a:endParaRPr lang="en-GB" dirty="0"/>
+          </a:p>
+          <a:p>
+            <a:r>
+              <a:rPr lang="en-GB" dirty="0"/>
+              <a:t>Better understanding of what </a:t>
+            </a:r>
+            <a:r>
+              <a:rPr lang="en-GB" dirty="0" err="1"/>
+              <a:t>OpenTelemetry</a:t>
+            </a:r>
+            <a:r>
+              <a:rPr lang="en-GB" dirty="0"/>
+              <a:t> is</a:t>
+            </a:r>
+          </a:p>
+          <a:p>
+            <a:r>
+              <a:rPr lang="en-GB" dirty="0"/>
+              <a:t>An example of how to add </a:t>
+            </a:r>
+            <a:r>
+              <a:rPr lang="en-GB" dirty="0" err="1"/>
+              <a:t>OpenTelemetry</a:t>
+            </a:r>
+            <a:r>
+              <a:rPr lang="en-GB" dirty="0"/>
+              <a:t> to a .NET application</a:t>
             </a:r>
           </a:p>
         </p:txBody>
@@ -4437,7 +5054,7 @@
     </p:spTree>
     <p:extLst>
       <p:ext uri="{BB962C8B-B14F-4D97-AF65-F5344CB8AC3E}">
-        <p14:creationId xmlns:p14="http://schemas.microsoft.com/office/powerpoint/2010/main" val="3743305174"/>
+        <p14:creationId xmlns:p14="http://schemas.microsoft.com/office/powerpoint/2010/main" val="3736642612"/>
       </p:ext>
     </p:extLst>
   </p:cSld>
@@ -4469,7 +5086,7 @@
           <p:cNvPr id="2" name="Title 1">
             <a:extLst>
               <a:ext uri="{FF2B5EF4-FFF2-40B4-BE49-F238E27FC236}">
-                <a16:creationId xmlns:a16="http://schemas.microsoft.com/office/drawing/2014/main" id="{F2C6746A-1521-8146-F74C-A1233F173D2C}"/>
+                <a16:creationId xmlns:a16="http://schemas.microsoft.com/office/drawing/2014/main" id="{06A256B9-3396-7782-7105-B2172B762D3C}"/>
               </a:ext>
             </a:extLst>
           </p:cNvPr>
@@ -4486,8 +5103,8 @@
           <a:lstStyle/>
           <a:p>
             <a:r>
-              <a:rPr lang="nb-NO" dirty="0"/>
-              <a:t>Agenda</a:t>
+              <a:rPr lang="en-NO" dirty="0"/>
+              <a:t>Shape of the workshop</a:t>
             </a:r>
           </a:p>
         </p:txBody>
@@ -4497,7 +5114,7 @@
           <p:cNvPr id="3" name="Content Placeholder 2">
             <a:extLst>
               <a:ext uri="{FF2B5EF4-FFF2-40B4-BE49-F238E27FC236}">
-                <a16:creationId xmlns:a16="http://schemas.microsoft.com/office/drawing/2014/main" id="{19ED8293-7823-7226-7F28-A334B8D3AF97}"/>
+                <a16:creationId xmlns:a16="http://schemas.microsoft.com/office/drawing/2014/main" id="{4DD0C720-4189-75AA-4423-359655BB8E71}"/>
               </a:ext>
             </a:extLst>
           </p:cNvPr>
@@ -4514,99 +5131,28 @@
           <a:lstStyle/>
           <a:p>
             <a:r>
-              <a:rPr lang="nb-NO" dirty="0" err="1"/>
-              <a:t>Clone</a:t>
-            </a:r>
-            <a:r>
-              <a:rPr lang="nb-NO" dirty="0"/>
-              <a:t> </a:t>
-            </a:r>
-            <a:r>
-              <a:rPr lang="nb-NO" dirty="0" err="1"/>
-              <a:t>repo</a:t>
-            </a:r>
-            <a:r>
-              <a:rPr lang="nb-NO" dirty="0"/>
-              <a:t>, and run «</a:t>
-            </a:r>
-            <a:r>
-              <a:rPr lang="nb-NO" dirty="0" err="1"/>
-              <a:t>docker</a:t>
-            </a:r>
-            <a:r>
-              <a:rPr lang="nb-NO" dirty="0"/>
-              <a:t> </a:t>
-            </a:r>
-            <a:r>
-              <a:rPr lang="nb-NO" dirty="0" err="1"/>
-              <a:t>compose</a:t>
-            </a:r>
-            <a:r>
-              <a:rPr lang="nb-NO" dirty="0"/>
-              <a:t> up» as </a:t>
-            </a:r>
-            <a:r>
-              <a:rPr lang="nb-NO" dirty="0" err="1"/>
-              <a:t>soon</a:t>
-            </a:r>
-            <a:r>
-              <a:rPr lang="nb-NO" dirty="0"/>
-              <a:t> as </a:t>
-            </a:r>
-            <a:r>
-              <a:rPr lang="nb-NO" dirty="0" err="1"/>
-              <a:t>possible</a:t>
-            </a:r>
-            <a:endParaRPr lang="nb-NO" dirty="0"/>
-          </a:p>
-          <a:p>
-            <a:r>
-              <a:rPr lang="nb-NO" dirty="0"/>
-              <a:t>Intro to </a:t>
-            </a:r>
-            <a:r>
-              <a:rPr lang="nb-NO" dirty="0" err="1"/>
-              <a:t>observability</a:t>
-            </a:r>
-            <a:r>
-              <a:rPr lang="nb-NO" dirty="0"/>
-              <a:t> and </a:t>
-            </a:r>
-            <a:r>
-              <a:rPr lang="nb-NO" dirty="0" err="1"/>
-              <a:t>OpenTelemetry</a:t>
-            </a:r>
-            <a:endParaRPr lang="nb-NO" dirty="0"/>
-          </a:p>
-          <a:p>
-            <a:r>
-              <a:rPr lang="nb-NO" dirty="0" err="1"/>
-              <a:t>Self</a:t>
-            </a:r>
-            <a:r>
-              <a:rPr lang="nb-NO" dirty="0"/>
-              <a:t> </a:t>
-            </a:r>
-            <a:r>
-              <a:rPr lang="nb-NO" dirty="0" err="1"/>
-              <a:t>paced</a:t>
-            </a:r>
-            <a:r>
-              <a:rPr lang="nb-NO" dirty="0"/>
-              <a:t> </a:t>
-            </a:r>
-            <a:r>
-              <a:rPr lang="nb-NO" dirty="0" err="1"/>
-              <a:t>tasks</a:t>
-            </a:r>
-            <a:endParaRPr lang="nb-NO" dirty="0"/>
+              <a:rPr lang="en-NO" dirty="0"/>
+              <a:t>Follow your own pace</a:t>
+            </a:r>
+          </a:p>
+          <a:p>
+            <a:r>
+              <a:rPr lang="en-NO" dirty="0"/>
+              <a:t>I will go through some solutiuons in plenium, if needed/requested. You can choose to listen or not</a:t>
+            </a:r>
+          </a:p>
+          <a:p>
+            <a:r>
+              <a:rPr lang="en-NO" dirty="0"/>
+              <a:t>Help each other and colaborate</a:t>
+            </a:r>
           </a:p>
         </p:txBody>
       </p:sp>
     </p:spTree>
     <p:extLst>
       <p:ext uri="{BB962C8B-B14F-4D97-AF65-F5344CB8AC3E}">
-        <p14:creationId xmlns:p14="http://schemas.microsoft.com/office/powerpoint/2010/main" val="929425913"/>
+        <p14:creationId xmlns:p14="http://schemas.microsoft.com/office/powerpoint/2010/main" val="3743305174"/>
       </p:ext>
     </p:extLst>
   </p:cSld>
@@ -4638,6 +5184,175 @@
           <p:cNvPr id="2" name="Title 1">
             <a:extLst>
               <a:ext uri="{FF2B5EF4-FFF2-40B4-BE49-F238E27FC236}">
+                <a16:creationId xmlns:a16="http://schemas.microsoft.com/office/drawing/2014/main" id="{F2C6746A-1521-8146-F74C-A1233F173D2C}"/>
+              </a:ext>
+            </a:extLst>
+          </p:cNvPr>
+          <p:cNvSpPr>
+            <a:spLocks noGrp="1"/>
+          </p:cNvSpPr>
+          <p:nvPr>
+            <p:ph type="title"/>
+          </p:nvPr>
+        </p:nvSpPr>
+        <p:spPr/>
+        <p:txBody>
+          <a:bodyPr/>
+          <a:lstStyle/>
+          <a:p>
+            <a:r>
+              <a:rPr lang="nb-NO" dirty="0"/>
+              <a:t>Agenda</a:t>
+            </a:r>
+          </a:p>
+        </p:txBody>
+      </p:sp>
+      <p:sp>
+        <p:nvSpPr>
+          <p:cNvPr id="3" name="Content Placeholder 2">
+            <a:extLst>
+              <a:ext uri="{FF2B5EF4-FFF2-40B4-BE49-F238E27FC236}">
+                <a16:creationId xmlns:a16="http://schemas.microsoft.com/office/drawing/2014/main" id="{19ED8293-7823-7226-7F28-A334B8D3AF97}"/>
+              </a:ext>
+            </a:extLst>
+          </p:cNvPr>
+          <p:cNvSpPr>
+            <a:spLocks noGrp="1"/>
+          </p:cNvSpPr>
+          <p:nvPr>
+            <p:ph idx="1"/>
+          </p:nvPr>
+        </p:nvSpPr>
+        <p:spPr/>
+        <p:txBody>
+          <a:bodyPr/>
+          <a:lstStyle/>
+          <a:p>
+            <a:r>
+              <a:rPr lang="nb-NO" dirty="0" err="1"/>
+              <a:t>Clone</a:t>
+            </a:r>
+            <a:r>
+              <a:rPr lang="nb-NO" dirty="0"/>
+              <a:t> </a:t>
+            </a:r>
+            <a:r>
+              <a:rPr lang="nb-NO" dirty="0" err="1"/>
+              <a:t>repo</a:t>
+            </a:r>
+            <a:r>
+              <a:rPr lang="nb-NO" dirty="0"/>
+              <a:t>, and run «</a:t>
+            </a:r>
+            <a:r>
+              <a:rPr lang="nb-NO" dirty="0" err="1"/>
+              <a:t>docker</a:t>
+            </a:r>
+            <a:r>
+              <a:rPr lang="nb-NO" dirty="0"/>
+              <a:t> </a:t>
+            </a:r>
+            <a:r>
+              <a:rPr lang="nb-NO" dirty="0" err="1"/>
+              <a:t>compose</a:t>
+            </a:r>
+            <a:r>
+              <a:rPr lang="nb-NO" dirty="0"/>
+              <a:t> up» as </a:t>
+            </a:r>
+            <a:r>
+              <a:rPr lang="nb-NO" dirty="0" err="1"/>
+              <a:t>soon</a:t>
+            </a:r>
+            <a:r>
+              <a:rPr lang="nb-NO" dirty="0"/>
+              <a:t> as </a:t>
+            </a:r>
+            <a:r>
+              <a:rPr lang="nb-NO" dirty="0" err="1"/>
+              <a:t>possible</a:t>
+            </a:r>
+            <a:endParaRPr lang="nb-NO" dirty="0"/>
+          </a:p>
+          <a:p>
+            <a:r>
+              <a:rPr lang="nb-NO" dirty="0"/>
+              <a:t>Intro to </a:t>
+            </a:r>
+            <a:r>
+              <a:rPr lang="nb-NO" dirty="0" err="1"/>
+              <a:t>observability</a:t>
+            </a:r>
+            <a:r>
+              <a:rPr lang="nb-NO" dirty="0"/>
+              <a:t> and </a:t>
+            </a:r>
+            <a:r>
+              <a:rPr lang="nb-NO" dirty="0" err="1"/>
+              <a:t>OpenTelemetry</a:t>
+            </a:r>
+            <a:endParaRPr lang="nb-NO" dirty="0"/>
+          </a:p>
+          <a:p>
+            <a:r>
+              <a:rPr lang="nb-NO" dirty="0" err="1"/>
+              <a:t>Self</a:t>
+            </a:r>
+            <a:r>
+              <a:rPr lang="nb-NO" dirty="0"/>
+              <a:t> </a:t>
+            </a:r>
+            <a:r>
+              <a:rPr lang="nb-NO" dirty="0" err="1"/>
+              <a:t>paced</a:t>
+            </a:r>
+            <a:r>
+              <a:rPr lang="nb-NO" dirty="0"/>
+              <a:t> </a:t>
+            </a:r>
+            <a:r>
+              <a:rPr lang="nb-NO" dirty="0" err="1"/>
+              <a:t>tasks</a:t>
+            </a:r>
+            <a:endParaRPr lang="nb-NO" dirty="0"/>
+          </a:p>
+        </p:txBody>
+      </p:sp>
+    </p:spTree>
+    <p:extLst>
+      <p:ext uri="{BB962C8B-B14F-4D97-AF65-F5344CB8AC3E}">
+        <p14:creationId xmlns:p14="http://schemas.microsoft.com/office/powerpoint/2010/main" val="929425913"/>
+      </p:ext>
+    </p:extLst>
+  </p:cSld>
+  <p:clrMapOvr>
+    <a:masterClrMapping/>
+  </p:clrMapOvr>
+</p:sld>
+</file>
+
+<file path=ppt/slides/slide6.xml><?xml version="1.0" encoding="utf-8"?>
+<p:sld xmlns:a="http://schemas.openxmlformats.org/drawingml/2006/main" xmlns:r="http://schemas.openxmlformats.org/officeDocument/2006/relationships" xmlns:p="http://schemas.openxmlformats.org/presentationml/2006/main">
+  <p:cSld>
+    <p:spTree>
+      <p:nvGrpSpPr>
+        <p:cNvPr id="1" name=""/>
+        <p:cNvGrpSpPr/>
+        <p:nvPr/>
+      </p:nvGrpSpPr>
+      <p:grpSpPr>
+        <a:xfrm>
+          <a:off x="0" y="0"/>
+          <a:ext cx="0" cy="0"/>
+          <a:chOff x="0" y="0"/>
+          <a:chExt cx="0" cy="0"/>
+        </a:xfrm>
+      </p:grpSpPr>
+      <p:sp>
+        <p:nvSpPr>
+          <p:cNvPr id="2" name="Title 1">
+            <a:extLst>
+              <a:ext uri="{FF2B5EF4-FFF2-40B4-BE49-F238E27FC236}">
                 <a16:creationId xmlns:a16="http://schemas.microsoft.com/office/drawing/2014/main" id="{536D1050-D4C9-058A-2BAB-D863E9F0D6A2}"/>
               </a:ext>
             </a:extLst>
@@ -4805,12 +5520,8 @@
           </a:p>
           <a:p>
             <a:r>
-              <a:rPr lang="nb-NO"/>
-              <a:t>Symptom </a:t>
-            </a:r>
-            <a:r>
               <a:rPr lang="nb-NO" dirty="0"/>
-              <a:t>=&gt;  </a:t>
+              <a:t>Symptom =&gt;  </a:t>
             </a:r>
             <a:r>
               <a:rPr lang="nb-NO" dirty="0" err="1"/>
@@ -4888,7 +5599,7 @@
 </p:sld>
 </file>
 
-<file path=ppt/slides/slide6.xml><?xml version="1.0" encoding="utf-8"?>
+<file path=ppt/slides/slide7.xml><?xml version="1.0" encoding="utf-8"?>
 <p:sld xmlns:a="http://schemas.openxmlformats.org/drawingml/2006/main" xmlns:r="http://schemas.openxmlformats.org/officeDocument/2006/relationships" xmlns:p="http://schemas.openxmlformats.org/presentationml/2006/main">
   <p:cSld>
     <p:spTree>
@@ -4926,7 +5637,10 @@
           <a:bodyPr/>
           <a:lstStyle/>
           <a:p>
-            <a:endParaRPr lang="en-NO"/>
+            <a:r>
+              <a:rPr lang="en-NO" dirty="0"/>
+              <a:t>What we want</a:t>
+            </a:r>
           </a:p>
         </p:txBody>
       </p:sp>
@@ -4992,138 +5706,6 @@
 </p:sld>
 </file>
 
-<file path=ppt/slides/slide7.xml><?xml version="1.0" encoding="utf-8"?>
-<p:sld xmlns:a="http://schemas.openxmlformats.org/drawingml/2006/main" xmlns:r="http://schemas.openxmlformats.org/officeDocument/2006/relationships" xmlns:p="http://schemas.openxmlformats.org/presentationml/2006/main">
-  <p:cSld>
-    <p:spTree>
-      <p:nvGrpSpPr>
-        <p:cNvPr id="1" name=""/>
-        <p:cNvGrpSpPr/>
-        <p:nvPr/>
-      </p:nvGrpSpPr>
-      <p:grpSpPr>
-        <a:xfrm>
-          <a:off x="0" y="0"/>
-          <a:ext cx="0" cy="0"/>
-          <a:chOff x="0" y="0"/>
-          <a:chExt cx="0" cy="0"/>
-        </a:xfrm>
-      </p:grpSpPr>
-      <p:sp>
-        <p:nvSpPr>
-          <p:cNvPr id="2" name="Title 1">
-            <a:extLst>
-              <a:ext uri="{FF2B5EF4-FFF2-40B4-BE49-F238E27FC236}">
-                <a16:creationId xmlns:a16="http://schemas.microsoft.com/office/drawing/2014/main" id="{DCCCB45C-2ED4-4761-476A-2270CA709153}"/>
-              </a:ext>
-            </a:extLst>
-          </p:cNvPr>
-          <p:cNvSpPr>
-            <a:spLocks noGrp="1"/>
-          </p:cNvSpPr>
-          <p:nvPr>
-            <p:ph type="title"/>
-          </p:nvPr>
-        </p:nvSpPr>
-        <p:spPr/>
-        <p:txBody>
-          <a:bodyPr/>
-          <a:lstStyle/>
-          <a:p>
-            <a:r>
-              <a:rPr lang="en-NO" dirty="0"/>
-              <a:t>OpenTelemetry</a:t>
-            </a:r>
-          </a:p>
-        </p:txBody>
-      </p:sp>
-      <p:sp>
-        <p:nvSpPr>
-          <p:cNvPr id="3" name="Content Placeholder 2">
-            <a:extLst>
-              <a:ext uri="{FF2B5EF4-FFF2-40B4-BE49-F238E27FC236}">
-                <a16:creationId xmlns:a16="http://schemas.microsoft.com/office/drawing/2014/main" id="{67D5C9B6-EF36-BCBD-F07D-820C9651DCCD}"/>
-              </a:ext>
-            </a:extLst>
-          </p:cNvPr>
-          <p:cNvSpPr>
-            <a:spLocks noGrp="1"/>
-          </p:cNvSpPr>
-          <p:nvPr>
-            <p:ph idx="1"/>
-          </p:nvPr>
-        </p:nvSpPr>
-        <p:spPr/>
-        <p:txBody>
-          <a:bodyPr/>
-          <a:lstStyle/>
-          <a:p>
-            <a:r>
-              <a:rPr lang="en-GB" dirty="0"/>
-              <a:t>High-quality, ubiquitous, and portable telemetry to enable effective observability</a:t>
-            </a:r>
-          </a:p>
-          <a:p>
-            <a:r>
-              <a:rPr lang="en-GB" dirty="0"/>
-              <a:t>A collection of APIs, SDKs, and tools. Use it to instrument, generate, collect, and export telemetry data (metrics, logs and traces) to help you </a:t>
-            </a:r>
-            <a:r>
-              <a:rPr lang="en-GB" dirty="0" err="1"/>
-              <a:t>analyze</a:t>
-            </a:r>
-            <a:r>
-              <a:rPr lang="en-GB" dirty="0"/>
-              <a:t> your software's performance and </a:t>
-            </a:r>
-            <a:r>
-              <a:rPr lang="en-GB" dirty="0" err="1"/>
-              <a:t>behavior</a:t>
-            </a:r>
-            <a:r>
-              <a:rPr lang="en-GB" dirty="0"/>
-              <a:t>.</a:t>
-            </a:r>
-          </a:p>
-          <a:p>
-            <a:pPr marL="0" indent="0">
-              <a:buNone/>
-            </a:pPr>
-            <a:endParaRPr lang="en-GB" dirty="0"/>
-          </a:p>
-          <a:p>
-            <a:pPr marL="0" indent="0">
-              <a:buNone/>
-            </a:pPr>
-            <a:r>
-              <a:rPr lang="en-GB" dirty="0">
-                <a:hlinkClick r:id="rId3"/>
-              </a:rPr>
-              <a:t>https://github.com/open-telemetry</a:t>
-            </a:r>
-            <a:endParaRPr lang="en-GB" dirty="0"/>
-          </a:p>
-          <a:p>
-            <a:pPr marL="0" indent="0">
-              <a:buNone/>
-            </a:pPr>
-            <a:endParaRPr lang="en-NO" dirty="0"/>
-          </a:p>
-        </p:txBody>
-      </p:sp>
-    </p:spTree>
-    <p:extLst>
-      <p:ext uri="{BB962C8B-B14F-4D97-AF65-F5344CB8AC3E}">
-        <p14:creationId xmlns:p14="http://schemas.microsoft.com/office/powerpoint/2010/main" val="489532701"/>
-      </p:ext>
-    </p:extLst>
-  </p:cSld>
-  <p:clrMapOvr>
-    <a:masterClrMapping/>
-  </p:clrMapOvr>
-</p:sld>
-</file>
-
 <file path=ppt/slides/slide8.xml><?xml version="1.0" encoding="utf-8"?>
 <p:sld xmlns:a="http://schemas.openxmlformats.org/drawingml/2006/main" xmlns:r="http://schemas.openxmlformats.org/officeDocument/2006/relationships" xmlns:p="http://schemas.openxmlformats.org/presentationml/2006/main">
   <p:cSld>
@@ -5141,39 +5723,112 @@
           <a:chExt cx="0" cy="0"/>
         </a:xfrm>
       </p:grpSpPr>
-      <p:pic>
-        <p:nvPicPr>
-          <p:cNvPr id="5" name="Content Placeholder 4" descr="A screenshot of a computer&#10;&#10;Description automatically generated">
-            <a:extLst>
-              <a:ext uri="{FF2B5EF4-FFF2-40B4-BE49-F238E27FC236}">
-                <a16:creationId xmlns:a16="http://schemas.microsoft.com/office/drawing/2014/main" id="{5F94B2CF-5ACC-8FD7-31AC-E97D51B6C432}"/>
-              </a:ext>
-            </a:extLst>
-          </p:cNvPr>
-          <p:cNvPicPr>
-            <a:picLocks noGrp="1" noChangeAspect="1"/>
-          </p:cNvPicPr>
+      <p:sp>
+        <p:nvSpPr>
+          <p:cNvPr id="2" name="Title 1">
+            <a:extLst>
+              <a:ext uri="{FF2B5EF4-FFF2-40B4-BE49-F238E27FC236}">
+                <a16:creationId xmlns:a16="http://schemas.microsoft.com/office/drawing/2014/main" id="{DCCCB45C-2ED4-4761-476A-2270CA709153}"/>
+              </a:ext>
+            </a:extLst>
+          </p:cNvPr>
+          <p:cNvSpPr>
+            <a:spLocks noGrp="1"/>
+          </p:cNvSpPr>
+          <p:nvPr>
+            <p:ph type="title"/>
+          </p:nvPr>
+        </p:nvSpPr>
+        <p:spPr/>
+        <p:txBody>
+          <a:bodyPr/>
+          <a:lstStyle/>
+          <a:p>
+            <a:r>
+              <a:rPr lang="en-NO" dirty="0"/>
+              <a:t>OpenTelemetry</a:t>
+            </a:r>
+          </a:p>
+        </p:txBody>
+      </p:sp>
+      <p:sp>
+        <p:nvSpPr>
+          <p:cNvPr id="3" name="Content Placeholder 2">
+            <a:extLst>
+              <a:ext uri="{FF2B5EF4-FFF2-40B4-BE49-F238E27FC236}">
+                <a16:creationId xmlns:a16="http://schemas.microsoft.com/office/drawing/2014/main" id="{67D5C9B6-EF36-BCBD-F07D-820C9651DCCD}"/>
+              </a:ext>
+            </a:extLst>
+          </p:cNvPr>
+          <p:cNvSpPr>
+            <a:spLocks noGrp="1"/>
+          </p:cNvSpPr>
           <p:nvPr>
             <p:ph idx="1"/>
           </p:nvPr>
-        </p:nvPicPr>
-        <p:blipFill>
-          <a:blip r:embed="rId2"/>
-          <a:stretch>
-            <a:fillRect/>
-          </a:stretch>
-        </p:blipFill>
-        <p:spPr>
-          <a:xfrm>
-            <a:off x="1046144" y="457200"/>
-            <a:ext cx="10099712" cy="5336704"/>
-          </a:xfrm>
-        </p:spPr>
-      </p:pic>
+        </p:nvSpPr>
+        <p:spPr/>
+        <p:txBody>
+          <a:bodyPr/>
+          <a:lstStyle/>
+          <a:p>
+            <a:r>
+              <a:rPr lang="en-GB" dirty="0"/>
+              <a:t>High-quality, ubiquitous, and portable telemetry to enable effective observability</a:t>
+            </a:r>
+          </a:p>
+          <a:p>
+            <a:r>
+              <a:rPr lang="en-GB" dirty="0"/>
+              <a:t>A collection of APIs, SDKs, and tools. Use it to instrument, generate, collect, and export telemetry data (metrics, logs and traces) to help you </a:t>
+            </a:r>
+            <a:r>
+              <a:rPr lang="en-GB" dirty="0" err="1"/>
+              <a:t>analyze</a:t>
+            </a:r>
+            <a:r>
+              <a:rPr lang="en-GB" dirty="0"/>
+              <a:t> your software's performance and </a:t>
+            </a:r>
+            <a:r>
+              <a:rPr lang="en-GB" dirty="0" err="1"/>
+              <a:t>behavior</a:t>
+            </a:r>
+            <a:r>
+              <a:rPr lang="en-GB" dirty="0"/>
+              <a:t>.</a:t>
+            </a:r>
+          </a:p>
+          <a:p>
+            <a:pPr marL="0" indent="0">
+              <a:buNone/>
+            </a:pPr>
+            <a:endParaRPr lang="en-GB" dirty="0"/>
+          </a:p>
+          <a:p>
+            <a:pPr marL="0" indent="0">
+              <a:buNone/>
+            </a:pPr>
+            <a:r>
+              <a:rPr lang="en-GB" dirty="0">
+                <a:hlinkClick r:id="rId3"/>
+              </a:rPr>
+              <a:t>https://github.com/open-telemetry</a:t>
+            </a:r>
+            <a:endParaRPr lang="en-GB" dirty="0"/>
+          </a:p>
+          <a:p>
+            <a:pPr marL="0" indent="0">
+              <a:buNone/>
+            </a:pPr>
+            <a:endParaRPr lang="en-NO" dirty="0"/>
+          </a:p>
+        </p:txBody>
+      </p:sp>
     </p:spTree>
     <p:extLst>
       <p:ext uri="{BB962C8B-B14F-4D97-AF65-F5344CB8AC3E}">
-        <p14:creationId xmlns:p14="http://schemas.microsoft.com/office/powerpoint/2010/main" val="1352849483"/>
+        <p14:creationId xmlns:p14="http://schemas.microsoft.com/office/powerpoint/2010/main" val="489532701"/>
       </p:ext>
     </p:extLst>
   </p:cSld>
@@ -5200,108 +5855,39 @@
           <a:chExt cx="0" cy="0"/>
         </a:xfrm>
       </p:grpSpPr>
-      <p:sp>
-        <p:nvSpPr>
-          <p:cNvPr id="2" name="Title 1">
-            <a:extLst>
-              <a:ext uri="{FF2B5EF4-FFF2-40B4-BE49-F238E27FC236}">
-                <a16:creationId xmlns:a16="http://schemas.microsoft.com/office/drawing/2014/main" id="{6943A4DA-3EB0-2D66-870C-52F9216C1666}"/>
-              </a:ext>
-            </a:extLst>
-          </p:cNvPr>
-          <p:cNvSpPr>
-            <a:spLocks noGrp="1"/>
-          </p:cNvSpPr>
-          <p:nvPr>
-            <p:ph type="title"/>
-          </p:nvPr>
-        </p:nvSpPr>
-        <p:spPr/>
-        <p:txBody>
-          <a:bodyPr/>
-          <a:lstStyle/>
-          <a:p>
-            <a:r>
-              <a:rPr lang="nb-NO" dirty="0"/>
-              <a:t>Signals</a:t>
-            </a:r>
-          </a:p>
-        </p:txBody>
-      </p:sp>
-      <p:sp>
-        <p:nvSpPr>
-          <p:cNvPr id="3" name="Content Placeholder 2">
-            <a:extLst>
-              <a:ext uri="{FF2B5EF4-FFF2-40B4-BE49-F238E27FC236}">
-                <a16:creationId xmlns:a16="http://schemas.microsoft.com/office/drawing/2014/main" id="{0FE594A9-147F-442B-B4F5-5443F89AC366}"/>
-              </a:ext>
-            </a:extLst>
-          </p:cNvPr>
-          <p:cNvSpPr>
-            <a:spLocks noGrp="1"/>
-          </p:cNvSpPr>
+      <p:pic>
+        <p:nvPicPr>
+          <p:cNvPr id="5" name="Content Placeholder 4" descr="A screenshot of a computer&#10;&#10;Description automatically generated">
+            <a:extLst>
+              <a:ext uri="{FF2B5EF4-FFF2-40B4-BE49-F238E27FC236}">
+                <a16:creationId xmlns:a16="http://schemas.microsoft.com/office/drawing/2014/main" id="{5F94B2CF-5ACC-8FD7-31AC-E97D51B6C432}"/>
+              </a:ext>
+            </a:extLst>
+          </p:cNvPr>
+          <p:cNvPicPr>
+            <a:picLocks noGrp="1" noChangeAspect="1"/>
+          </p:cNvPicPr>
           <p:nvPr>
             <p:ph idx="1"/>
           </p:nvPr>
-        </p:nvSpPr>
-        <p:spPr/>
-        <p:txBody>
-          <a:bodyPr/>
-          <a:lstStyle/>
-          <a:p>
-            <a:r>
-              <a:rPr lang="nb-NO" dirty="0"/>
-              <a:t>Traces –&gt; Connect </a:t>
-            </a:r>
-            <a:r>
-              <a:rPr lang="nb-NO" dirty="0" err="1"/>
-              <a:t>the</a:t>
-            </a:r>
-            <a:r>
-              <a:rPr lang="nb-NO" dirty="0"/>
-              <a:t> </a:t>
-            </a:r>
-            <a:r>
-              <a:rPr lang="nb-NO" dirty="0" err="1"/>
-              <a:t>components</a:t>
-            </a:r>
-            <a:endParaRPr lang="nb-NO" dirty="0"/>
-          </a:p>
-          <a:p>
-            <a:r>
-              <a:rPr lang="nb-NO" dirty="0" err="1"/>
-              <a:t>Metrics</a:t>
-            </a:r>
-            <a:r>
-              <a:rPr lang="nb-NO" dirty="0"/>
-              <a:t> -&gt; </a:t>
-            </a:r>
-            <a:r>
-              <a:rPr lang="nb-NO" dirty="0" err="1"/>
-              <a:t>Quantify</a:t>
-            </a:r>
-            <a:r>
-              <a:rPr lang="nb-NO" dirty="0"/>
-              <a:t> and show </a:t>
-            </a:r>
-            <a:r>
-              <a:rPr lang="nb-NO" dirty="0" err="1"/>
-              <a:t>statistics</a:t>
-            </a:r>
-            <a:endParaRPr lang="nb-NO" dirty="0"/>
-          </a:p>
-          <a:p>
-            <a:r>
-              <a:rPr lang="nb-NO" dirty="0"/>
-              <a:t>Logs -&gt; Tell a story</a:t>
-            </a:r>
-          </a:p>
-        </p:txBody>
-      </p:sp>
+        </p:nvPicPr>
+        <p:blipFill>
+          <a:blip r:embed="rId3"/>
+          <a:stretch>
+            <a:fillRect/>
+          </a:stretch>
+        </p:blipFill>
+        <p:spPr>
+          <a:xfrm>
+            <a:off x="1046144" y="457200"/>
+            <a:ext cx="10099712" cy="5336704"/>
+          </a:xfrm>
+        </p:spPr>
+      </p:pic>
     </p:spTree>
     <p:extLst>
       <p:ext uri="{BB962C8B-B14F-4D97-AF65-F5344CB8AC3E}">
-        <p14:creationId xmlns:p14="http://schemas.microsoft.com/office/powerpoint/2010/main" val="1761284807"/>
+        <p14:creationId xmlns:p14="http://schemas.microsoft.com/office/powerpoint/2010/main" val="1352849483"/>
       </p:ext>
     </p:extLst>
   </p:cSld>

</xml_diff>